<commit_message>
Update Template for design presentation.pptx
</commit_message>
<xml_diff>
--- a/Template for design presentation.pptx
+++ b/Template for design presentation.pptx
@@ -4383,13 +4383,16 @@
           <a:p>
             <a:r>
               <a:rPr lang="en-US" dirty="0"/>
-              <a:t>Uncertainty budget (optional), note if included you may </a:t>
-            </a:r>
-            <a:r>
-              <a:rPr lang="en-US"/>
-              <a:t>get feedback</a:t>
-            </a:r>
-            <a:endParaRPr lang="en-US" dirty="0"/>
+              <a:t>Uncertainty budget (optional); </a:t>
+            </a:r>
+            <a:r>
+              <a:rPr lang="en-US"/>
+              <a:t>However, </a:t>
+            </a:r>
+            <a:r>
+              <a:rPr lang="en-US" dirty="0"/>
+              <a:t>if included you may get feedback from judges.</a:t>
+            </a:r>
           </a:p>
           <a:p>
             <a:r>

</xml_diff>